<commit_message>
Update to Powerpoint - Still unfinished
Still need touchups for What was easy, and what was hard.
</commit_message>
<xml_diff>
--- a/Documentation/FAAR.pptx
+++ b/Documentation/FAAR.pptx
@@ -110,6 +110,11 @@
       </a:defRPr>
     </a:lvl9pPr>
   </p:defaultTextStyle>
+  <p:extLst>
+    <p:ext uri="{EFAFB233-063F-42B5-8137-9DF3F51BA10A}">
+      <p15:sldGuideLst xmlns:p15="http://schemas.microsoft.com/office/powerpoint/2012/main"/>
+    </p:ext>
+  </p:extLst>
 </p:presentation>
 </file>
 
@@ -7730,10 +7735,18 @@
           <a:bodyPr/>
           <a:lstStyle/>
           <a:p>
+            <a:pPr algn="ctr"/>
             <a:r>
               <a:rPr lang="en-US" dirty="0" smtClean="0"/>
               <a:t>FAAR</a:t>
             </a:r>
+            <a:br>
+              <a:rPr lang="en-US" dirty="0" smtClean="0"/>
+            </a:br>
+            <a:r>
+              <a:rPr lang="en-US" sz="3600" dirty="0" smtClean="0"/>
+              <a:t>We’ll Take You FAAR</a:t>
+            </a:r>
             <a:endParaRPr lang="en-US" dirty="0"/>
           </a:p>
         </p:txBody>
@@ -7748,12 +7761,40 @@
             <p:ph type="subTitle" idx="1"/>
           </p:nvPr>
         </p:nvSpPr>
-        <p:spPr/>
-        <p:txBody>
-          <a:bodyPr/>
+        <p:spPr>
+          <a:xfrm>
+            <a:off x="680322" y="4394039"/>
+            <a:ext cx="8144134" cy="1380685"/>
+          </a:xfrm>
+        </p:spPr>
+        <p:txBody>
+          <a:bodyPr>
+            <a:normAutofit fontScale="92500" lnSpcReduction="20000"/>
+          </a:bodyPr>
           <a:lstStyle/>
           <a:p>
-            <a:endParaRPr lang="en-US" dirty="0"/>
+            <a:r>
+              <a:rPr lang="en-US" dirty="0" smtClean="0"/>
+              <a:t>Fabian C.</a:t>
+            </a:r>
+          </a:p>
+          <a:p>
+            <a:r>
+              <a:rPr lang="en-US" dirty="0" smtClean="0"/>
+              <a:t>Aaron B.</a:t>
+            </a:r>
+          </a:p>
+          <a:p>
+            <a:r>
+              <a:rPr lang="en-US" dirty="0" smtClean="0"/>
+              <a:t>Austin B.</a:t>
+            </a:r>
+          </a:p>
+          <a:p>
+            <a:r>
+              <a:rPr lang="en-US" dirty="0" smtClean="0"/>
+              <a:t>Roberto M.</a:t>
+            </a:r>
           </a:p>
         </p:txBody>
       </p:sp>
@@ -7804,7 +7845,15 @@
           <a:p>
             <a:r>
               <a:rPr lang="en-US" dirty="0" smtClean="0"/>
-              <a:t>What we did</a:t>
+              <a:t>What </a:t>
+            </a:r>
+            <a:r>
+              <a:rPr lang="en-US" dirty="0" smtClean="0"/>
+              <a:t>We D</a:t>
+            </a:r>
+            <a:r>
+              <a:rPr lang="en-US" dirty="0" smtClean="0"/>
+              <a:t>id</a:t>
             </a:r>
             <a:endParaRPr lang="en-US" dirty="0"/>
           </a:p>
@@ -7820,40 +7869,77 @@
             <p:ph idx="1"/>
           </p:nvPr>
         </p:nvSpPr>
-        <p:spPr/>
-        <p:txBody>
-          <a:bodyPr/>
+        <p:spPr>
+          <a:xfrm>
+            <a:off x="680321" y="2336872"/>
+            <a:ext cx="9613861" cy="3759127"/>
+          </a:xfrm>
+        </p:spPr>
+        <p:txBody>
+          <a:bodyPr>
+            <a:normAutofit/>
+          </a:bodyPr>
           <a:lstStyle/>
           <a:p>
             <a:r>
-              <a:rPr lang="en-US" dirty="0" smtClean="0"/>
-              <a:t>Made a website</a:t>
-            </a:r>
-          </a:p>
-          <a:p>
-            <a:r>
-              <a:rPr lang="en-US" dirty="0" smtClean="0"/>
-              <a:t>Used GitHub</a:t>
-            </a:r>
-          </a:p>
-          <a:p>
-            <a:r>
-              <a:rPr lang="en-US" dirty="0" smtClean="0"/>
-              <a:t>Servlet and Database to populate dynamic webpage</a:t>
-            </a:r>
-          </a:p>
-          <a:p>
-            <a:r>
-              <a:rPr lang="en-US" dirty="0" smtClean="0"/>
-              <a:t>Servlet to validate credit card numbers</a:t>
-            </a:r>
-          </a:p>
-          <a:p>
-            <a:r>
-              <a:rPr lang="en-US" dirty="0" smtClean="0"/>
+              <a:rPr lang="en-US" sz="2800" dirty="0" smtClean="0"/>
+              <a:t>Created and designed an e-commerce website that incorporated the following:</a:t>
+            </a:r>
+          </a:p>
+          <a:p>
+            <a:pPr lvl="1"/>
+            <a:r>
+              <a:rPr lang="en-US" sz="2400" dirty="0"/>
+              <a:t>MVC Architecture</a:t>
+            </a:r>
+          </a:p>
+          <a:p>
+            <a:pPr lvl="1"/>
+            <a:r>
+              <a:rPr lang="en-US" sz="2400" dirty="0"/>
+              <a:t>Servlets and </a:t>
+            </a:r>
+            <a:r>
+              <a:rPr lang="en-US" sz="2400" dirty="0" smtClean="0"/>
+              <a:t>database </a:t>
+            </a:r>
+            <a:r>
+              <a:rPr lang="en-US" sz="2400" dirty="0" smtClean="0"/>
+              <a:t>to populate dynamic </a:t>
+            </a:r>
+            <a:r>
+              <a:rPr lang="en-US" sz="2400" dirty="0" smtClean="0"/>
+              <a:t>webpage</a:t>
+            </a:r>
+          </a:p>
+          <a:p>
+            <a:pPr lvl="1"/>
+            <a:r>
+              <a:rPr lang="en-US" sz="2400" dirty="0" smtClean="0"/>
+              <a:t>A se</a:t>
+            </a:r>
+            <a:r>
+              <a:rPr lang="en-US" sz="2400" dirty="0" smtClean="0"/>
+              <a:t>rvlet </a:t>
+            </a:r>
+            <a:r>
+              <a:rPr lang="en-US" sz="2400" dirty="0" smtClean="0"/>
+              <a:t>to validate credit card numbers</a:t>
+            </a:r>
+          </a:p>
+          <a:p>
+            <a:pPr lvl="1"/>
+            <a:r>
+              <a:rPr lang="en-US" sz="2400" dirty="0" smtClean="0"/>
               <a:t>Non persistent cookies to store cart information while in session. </a:t>
             </a:r>
-            <a:endParaRPr lang="en-US" dirty="0"/>
+          </a:p>
+          <a:p>
+            <a:r>
+              <a:rPr lang="en-US" sz="2800" dirty="0" smtClean="0"/>
+              <a:t>Integrated GitHub in our group dynamics</a:t>
+            </a:r>
+            <a:endParaRPr lang="en-US" sz="2800" dirty="0" smtClean="0"/>
           </a:p>
         </p:txBody>
       </p:sp>
@@ -7927,25 +8013,41 @@
           <a:p>
             <a:r>
               <a:rPr lang="en-US" dirty="0" smtClean="0"/>
-              <a:t>3 – Client Server Communications</a:t>
-            </a:r>
-          </a:p>
-          <a:p>
+              <a:t>Lab 3 </a:t>
+            </a:r>
             <a:r>
               <a:rPr lang="en-US" dirty="0" smtClean="0"/>
-              <a:t>4 – Database Communication</a:t>
+              <a:t>– Client Server Communications</a:t>
             </a:r>
           </a:p>
           <a:p>
             <a:r>
               <a:rPr lang="en-US" dirty="0" smtClean="0"/>
-              <a:t>7 - Cookies</a:t>
-            </a:r>
-          </a:p>
-          <a:p>
+              <a:t>Lab 4 </a:t>
+            </a:r>
             <a:r>
               <a:rPr lang="en-US" dirty="0" smtClean="0"/>
-              <a:t>9 – Checkout Cart</a:t>
+              <a:t>– Database Communication</a:t>
+            </a:r>
+          </a:p>
+          <a:p>
+            <a:r>
+              <a:rPr lang="en-US" dirty="0" smtClean="0"/>
+              <a:t>Lab 7 </a:t>
+            </a:r>
+            <a:r>
+              <a:rPr lang="en-US" dirty="0" smtClean="0"/>
+              <a:t>- Cookies</a:t>
+            </a:r>
+          </a:p>
+          <a:p>
+            <a:r>
+              <a:rPr lang="en-US" dirty="0" smtClean="0"/>
+              <a:t>Lab 9 </a:t>
+            </a:r>
+            <a:r>
+              <a:rPr lang="en-US" dirty="0" smtClean="0"/>
+              <a:t>– Checkout Cart</a:t>
             </a:r>
             <a:endParaRPr lang="en-US" dirty="0"/>
           </a:p>

</xml_diff>

<commit_message>
Potential Final PowerPoint Version
PowerPoint presentation
</commit_message>
<xml_diff>
--- a/Documentation/FAAR.pptx
+++ b/Documentation/FAAR.pptx
@@ -392,7 +392,7 @@
           <a:p>
             <a:fld id="{AF239A9A-B4B0-4B32-B8CD-2E25E95134C4}" type="datetimeFigureOut">
               <a:rPr lang="en-US" dirty="0"/>
-              <a:t>4/29/2017</a:t>
+              <a:t>4/30/2017</a:t>
             </a:fld>
             <a:endParaRPr lang="en-US" dirty="0"/>
           </a:p>
@@ -801,7 +801,7 @@
           <a:p>
             <a:fld id="{F25518A9-B687-4302-9395-2322403C6656}" type="datetimeFigureOut">
               <a:rPr lang="en-US" dirty="0"/>
-              <a:t>4/29/2017</a:t>
+              <a:t>4/30/2017</a:t>
             </a:fld>
             <a:endParaRPr lang="en-US" dirty="0"/>
           </a:p>
@@ -1132,7 +1132,7 @@
           <a:p>
             <a:fld id="{1A99A684-0CB7-41E9-A4DF-5D1C2CA5BF6F}" type="datetimeFigureOut">
               <a:rPr lang="en-US" dirty="0"/>
-              <a:t>4/29/2017</a:t>
+              <a:t>4/30/2017</a:t>
             </a:fld>
             <a:endParaRPr lang="en-US" dirty="0"/>
           </a:p>
@@ -1532,7 +1532,7 @@
           <a:p>
             <a:fld id="{FEDD7C35-9E19-4518-A4B2-3B09CD8CC756}" type="datetimeFigureOut">
               <a:rPr lang="en-US" dirty="0"/>
-              <a:t>4/29/2017</a:t>
+              <a:t>4/30/2017</a:t>
             </a:fld>
             <a:endParaRPr lang="en-US" dirty="0"/>
           </a:p>
@@ -2095,7 +2095,7 @@
           <a:p>
             <a:fld id="{26196DA8-8897-4DDF-BFB6-5D83863C837A}" type="datetimeFigureOut">
               <a:rPr lang="en-US" dirty="0"/>
-              <a:t>4/29/2017</a:t>
+              <a:t>4/30/2017</a:t>
             </a:fld>
             <a:endParaRPr lang="en-US" dirty="0"/>
           </a:p>
@@ -2771,7 +2771,7 @@
           <a:p>
             <a:fld id="{DCBBA708-C5F0-412D-90E2-1919F0D196AE}" type="datetimeFigureOut">
               <a:rPr lang="en-US" dirty="0"/>
-              <a:t>4/29/2017</a:t>
+              <a:t>4/30/2017</a:t>
             </a:fld>
             <a:endParaRPr lang="en-US" dirty="0"/>
           </a:p>
@@ -3679,7 +3679,7 @@
           <a:p>
             <a:fld id="{A9C8F8FA-EF43-4642-9368-3F4E33039BD9}" type="datetimeFigureOut">
               <a:rPr lang="en-US" dirty="0"/>
-              <a:t>4/29/2017</a:t>
+              <a:t>4/30/2017</a:t>
             </a:fld>
             <a:endParaRPr lang="en-US" dirty="0"/>
           </a:p>
@@ -3987,7 +3987,7 @@
           <a:p>
             <a:fld id="{6B61E721-B01C-4D5D-A3CA-2E5518383F10}" type="datetimeFigureOut">
               <a:rPr lang="en-US" dirty="0"/>
-              <a:t>4/29/2017</a:t>
+              <a:t>4/30/2017</a:t>
             </a:fld>
             <a:endParaRPr lang="en-US" dirty="0"/>
           </a:p>
@@ -4246,7 +4246,7 @@
           <a:p>
             <a:fld id="{6513FEF9-69D0-4F8C-A336-59491FBEDC47}" type="datetimeFigureOut">
               <a:rPr lang="en-US" dirty="0"/>
-              <a:t>4/29/2017</a:t>
+              <a:t>4/30/2017</a:t>
             </a:fld>
             <a:endParaRPr lang="en-US" dirty="0"/>
           </a:p>
@@ -4583,7 +4583,7 @@
           <a:p>
             <a:fld id="{A91E21DC-8981-44E6-BC8C-2BA8F673FFBB}" type="datetimeFigureOut">
               <a:rPr lang="en-US" dirty="0"/>
-              <a:t>4/29/2017</a:t>
+              <a:t>4/30/2017</a:t>
             </a:fld>
             <a:endParaRPr lang="en-US" dirty="0"/>
           </a:p>
@@ -4967,7 +4967,7 @@
           <a:p>
             <a:fld id="{AEB9C5D3-0140-4E75-8D7F-C0623D06DFD7}" type="datetimeFigureOut">
               <a:rPr lang="en-US" dirty="0"/>
-              <a:t>4/29/2017</a:t>
+              <a:t>4/30/2017</a:t>
             </a:fld>
             <a:endParaRPr lang="en-US" dirty="0"/>
           </a:p>
@@ -5338,7 +5338,7 @@
           <a:p>
             <a:fld id="{3A5666F9-5B40-48E0-8DFD-99EF944CDD22}" type="datetimeFigureOut">
               <a:rPr lang="en-US" dirty="0"/>
-              <a:t>4/29/2017</a:t>
+              <a:t>4/30/2017</a:t>
             </a:fld>
             <a:endParaRPr lang="en-US" dirty="0"/>
           </a:p>
@@ -5839,7 +5839,7 @@
           <a:p>
             <a:fld id="{2A698D6B-2C72-4E21-9893-A649C6E2A47D}" type="datetimeFigureOut">
               <a:rPr lang="en-US" dirty="0"/>
-              <a:t>4/29/2017</a:t>
+              <a:t>4/30/2017</a:t>
             </a:fld>
             <a:endParaRPr lang="en-US" dirty="0"/>
           </a:p>
@@ -6091,7 +6091,7 @@
           <a:p>
             <a:fld id="{C86811C9-A66C-49F0-970E-F7B68D9109A0}" type="datetimeFigureOut">
               <a:rPr lang="en-US" dirty="0"/>
-              <a:t>4/29/2017</a:t>
+              <a:t>4/30/2017</a:t>
             </a:fld>
             <a:endParaRPr lang="en-US" dirty="0"/>
           </a:p>
@@ -6249,7 +6249,7 @@
           <a:p>
             <a:fld id="{6C01AE78-96A2-4A23-B183-3B6DB4374FE7}" type="datetimeFigureOut">
               <a:rPr lang="en-US" dirty="0"/>
-              <a:t>4/29/2017</a:t>
+              <a:t>4/30/2017</a:t>
             </a:fld>
             <a:endParaRPr lang="en-US" dirty="0"/>
           </a:p>
@@ -6634,7 +6634,7 @@
           <a:p>
             <a:fld id="{73AE0757-B101-4811-9189-10EB2F458E2D}" type="datetimeFigureOut">
               <a:rPr lang="en-US" dirty="0"/>
-              <a:t>4/29/2017</a:t>
+              <a:t>4/30/2017</a:t>
             </a:fld>
             <a:endParaRPr lang="en-US" dirty="0"/>
           </a:p>
@@ -7038,7 +7038,7 @@
           <a:p>
             <a:fld id="{7EBDC078-589F-40E3-816C-EE21D62B5BBA}" type="datetimeFigureOut">
               <a:rPr lang="en-US" dirty="0"/>
-              <a:t>4/29/2017</a:t>
+              <a:t>4/30/2017</a:t>
             </a:fld>
             <a:endParaRPr lang="en-US" dirty="0"/>
           </a:p>
@@ -7277,7 +7277,7 @@
           <a:p>
             <a:fld id="{C7004436-CA73-4D53-89B4-2A5C7347BF2F}" type="datetimeFigureOut">
               <a:rPr lang="en-US" dirty="0"/>
-              <a:t>4/29/2017</a:t>
+              <a:t>4/30/2017</a:t>
             </a:fld>
             <a:endParaRPr lang="en-US" dirty="0"/>
           </a:p>
@@ -7845,15 +7845,7 @@
           <a:p>
             <a:r>
               <a:rPr lang="en-US" dirty="0" smtClean="0"/>
-              <a:t>What </a:t>
-            </a:r>
-            <a:r>
-              <a:rPr lang="en-US" dirty="0" smtClean="0"/>
-              <a:t>We D</a:t>
-            </a:r>
-            <a:r>
-              <a:rPr lang="en-US" dirty="0" smtClean="0"/>
-              <a:t>id</a:t>
+              <a:t>What We Did</a:t>
             </a:r>
             <a:endParaRPr lang="en-US" dirty="0"/>
           </a:p>
@@ -7901,30 +7893,14 @@
             </a:r>
             <a:r>
               <a:rPr lang="en-US" sz="2400" dirty="0" smtClean="0"/>
-              <a:t>database </a:t>
-            </a:r>
+              <a:t>database to populate dynamic webpage</a:t>
+            </a:r>
+          </a:p>
+          <a:p>
+            <a:pPr lvl="1"/>
             <a:r>
               <a:rPr lang="en-US" sz="2400" dirty="0" smtClean="0"/>
-              <a:t>to populate dynamic </a:t>
-            </a:r>
-            <a:r>
-              <a:rPr lang="en-US" sz="2400" dirty="0" smtClean="0"/>
-              <a:t>webpage</a:t>
-            </a:r>
-          </a:p>
-          <a:p>
-            <a:pPr lvl="1"/>
-            <a:r>
-              <a:rPr lang="en-US" sz="2400" dirty="0" smtClean="0"/>
-              <a:t>A se</a:t>
-            </a:r>
-            <a:r>
-              <a:rPr lang="en-US" sz="2400" dirty="0" smtClean="0"/>
-              <a:t>rvlet </a:t>
-            </a:r>
-            <a:r>
-              <a:rPr lang="en-US" sz="2400" dirty="0" smtClean="0"/>
-              <a:t>to validate credit card numbers</a:t>
+              <a:t>A servlet to validate credit card numbers</a:t>
             </a:r>
           </a:p>
           <a:p>
@@ -7939,7 +7915,6 @@
               <a:rPr lang="en-US" sz="2800" dirty="0" smtClean="0"/>
               <a:t>Integrated GitHub in our group dynamics</a:t>
             </a:r>
-            <a:endParaRPr lang="en-US" sz="2800" dirty="0" smtClean="0"/>
           </a:p>
         </p:txBody>
       </p:sp>
@@ -8013,41 +7988,25 @@
           <a:p>
             <a:r>
               <a:rPr lang="en-US" dirty="0" smtClean="0"/>
-              <a:t>Lab 3 </a:t>
-            </a:r>
+              <a:t>Lab 3 – Client Server Communications</a:t>
+            </a:r>
+          </a:p>
+          <a:p>
             <a:r>
               <a:rPr lang="en-US" dirty="0" smtClean="0"/>
-              <a:t>– Client Server Communications</a:t>
+              <a:t>Lab 4 – Database Communication</a:t>
             </a:r>
           </a:p>
           <a:p>
             <a:r>
               <a:rPr lang="en-US" dirty="0" smtClean="0"/>
-              <a:t>Lab 4 </a:t>
-            </a:r>
+              <a:t>Lab 7 - Cookies</a:t>
+            </a:r>
+          </a:p>
+          <a:p>
             <a:r>
               <a:rPr lang="en-US" dirty="0" smtClean="0"/>
-              <a:t>– Database Communication</a:t>
-            </a:r>
-          </a:p>
-          <a:p>
-            <a:r>
-              <a:rPr lang="en-US" dirty="0" smtClean="0"/>
-              <a:t>Lab 7 </a:t>
-            </a:r>
-            <a:r>
-              <a:rPr lang="en-US" dirty="0" smtClean="0"/>
-              <a:t>- Cookies</a:t>
-            </a:r>
-          </a:p>
-          <a:p>
-            <a:r>
-              <a:rPr lang="en-US" dirty="0" smtClean="0"/>
-              <a:t>Lab 9 </a:t>
-            </a:r>
-            <a:r>
-              <a:rPr lang="en-US" dirty="0" smtClean="0"/>
-              <a:t>– Checkout Cart</a:t>
+              <a:t>Lab 9 – Checkout Cart</a:t>
             </a:r>
             <a:endParaRPr lang="en-US" dirty="0"/>
           </a:p>
@@ -8123,15 +8082,15 @@
           <a:p>
             <a:r>
               <a:rPr lang="en-US" dirty="0" smtClean="0"/>
-              <a:t>HTML </a:t>
-            </a:r>
+              <a:t>Documentation</a:t>
+            </a:r>
+            <a:endParaRPr lang="en-US" dirty="0"/>
           </a:p>
           <a:p>
             <a:r>
               <a:rPr lang="en-US" dirty="0" smtClean="0"/>
-              <a:t>Documentation</a:t>
-            </a:r>
-            <a:endParaRPr lang="en-US" dirty="0"/>
+              <a:t>Initial GitHub Integration </a:t>
+            </a:r>
           </a:p>
         </p:txBody>
       </p:sp>
@@ -8211,16 +8170,27 @@
           <a:p>
             <a:r>
               <a:rPr lang="en-US" dirty="0" smtClean="0"/>
-              <a:t>Getting everything to work with </a:t>
-            </a:r>
-            <a:r>
-              <a:rPr lang="en-US" dirty="0" err="1" smtClean="0"/>
-              <a:t>eachother</a:t>
-            </a:r>
-            <a:r>
-              <a:rPr lang="en-US" dirty="0"/>
-              <a:t>.</a:t>
-            </a:r>
+              <a:t>Getting </a:t>
+            </a:r>
+            <a:r>
+              <a:rPr lang="en-US" dirty="0" smtClean="0"/>
+              <a:t>all code to integrate with each other</a:t>
+            </a:r>
+          </a:p>
+          <a:p>
+            <a:r>
+              <a:rPr lang="en-US" dirty="0" smtClean="0"/>
+              <a:t>Time constraints of the project</a:t>
+            </a:r>
+          </a:p>
+          <a:p>
+            <a:r>
+              <a:rPr lang="en-US" dirty="0" smtClean="0"/>
+              <a:t>Group meeting times</a:t>
+            </a:r>
+          </a:p>
+          <a:p>
+            <a:endParaRPr lang="en-US" dirty="0"/>
           </a:p>
         </p:txBody>
       </p:sp>

</xml_diff>